<commit_message>
[v1.4] Docs update (#225)
* UserGuide: update

* mainapp: update

* include passwords.json

* update preferences.json

* UserGuide: update

* fix style'

* UserGuide: add reassign, terminology section

* DeveloperGuide: update checkin/checkout, CheckInCommandSequenceDiagram: fix

* DeveloperGuide: minor fix

* UserGuide: update reassign
</commit_message>
<xml_diff>
--- a/docs/diagrams/CheckinCommandSequenceDiagram.pptx
+++ b/docs/diagrams/CheckinCommandSequenceDiagram.pptx
@@ -104,6 +104,11 @@
       </a:defRPr>
     </a:lvl9pPr>
   </p:defaultTextStyle>
+  <p:extLst>
+    <p:ext uri="{EFAFB233-063F-42B5-8137-9DF3F51BA10A}">
+      <p15:sldGuideLst xmlns:p15="http://schemas.microsoft.com/office/powerpoint/2012/main"/>
+    </p:ext>
+  </p:extLst>
 </p:presentation>
 </file>
 
@@ -256,7 +261,7 @@
           <a:p>
             <a:fld id="{0C1B189D-E4F8-4061-918E-829FAEE4348D}" type="datetimeFigureOut">
               <a:rPr lang="en-CA" smtClean="0"/>
-              <a:t>2018-10-25</a:t>
+              <a:t>2018-11-08</a:t>
             </a:fld>
             <a:endParaRPr lang="en-CA"/>
           </a:p>
@@ -456,7 +461,7 @@
           <a:p>
             <a:fld id="{0C1B189D-E4F8-4061-918E-829FAEE4348D}" type="datetimeFigureOut">
               <a:rPr lang="en-CA" smtClean="0"/>
-              <a:t>2018-10-25</a:t>
+              <a:t>2018-11-08</a:t>
             </a:fld>
             <a:endParaRPr lang="en-CA"/>
           </a:p>
@@ -666,7 +671,7 @@
           <a:p>
             <a:fld id="{0C1B189D-E4F8-4061-918E-829FAEE4348D}" type="datetimeFigureOut">
               <a:rPr lang="en-CA" smtClean="0"/>
-              <a:t>2018-10-25</a:t>
+              <a:t>2018-11-08</a:t>
             </a:fld>
             <a:endParaRPr lang="en-CA"/>
           </a:p>
@@ -866,7 +871,7 @@
           <a:p>
             <a:fld id="{0C1B189D-E4F8-4061-918E-829FAEE4348D}" type="datetimeFigureOut">
               <a:rPr lang="en-CA" smtClean="0"/>
-              <a:t>2018-10-25</a:t>
+              <a:t>2018-11-08</a:t>
             </a:fld>
             <a:endParaRPr lang="en-CA"/>
           </a:p>
@@ -1142,7 +1147,7 @@
           <a:p>
             <a:fld id="{0C1B189D-E4F8-4061-918E-829FAEE4348D}" type="datetimeFigureOut">
               <a:rPr lang="en-CA" smtClean="0"/>
-              <a:t>2018-10-25</a:t>
+              <a:t>2018-11-08</a:t>
             </a:fld>
             <a:endParaRPr lang="en-CA"/>
           </a:p>
@@ -1410,7 +1415,7 @@
           <a:p>
             <a:fld id="{0C1B189D-E4F8-4061-918E-829FAEE4348D}" type="datetimeFigureOut">
               <a:rPr lang="en-CA" smtClean="0"/>
-              <a:t>2018-10-25</a:t>
+              <a:t>2018-11-08</a:t>
             </a:fld>
             <a:endParaRPr lang="en-CA"/>
           </a:p>
@@ -1825,7 +1830,7 @@
           <a:p>
             <a:fld id="{0C1B189D-E4F8-4061-918E-829FAEE4348D}" type="datetimeFigureOut">
               <a:rPr lang="en-CA" smtClean="0"/>
-              <a:t>2018-10-25</a:t>
+              <a:t>2018-11-08</a:t>
             </a:fld>
             <a:endParaRPr lang="en-CA"/>
           </a:p>
@@ -1967,7 +1972,7 @@
           <a:p>
             <a:fld id="{0C1B189D-E4F8-4061-918E-829FAEE4348D}" type="datetimeFigureOut">
               <a:rPr lang="en-CA" smtClean="0"/>
-              <a:t>2018-10-25</a:t>
+              <a:t>2018-11-08</a:t>
             </a:fld>
             <a:endParaRPr lang="en-CA"/>
           </a:p>
@@ -2080,7 +2085,7 @@
           <a:p>
             <a:fld id="{0C1B189D-E4F8-4061-918E-829FAEE4348D}" type="datetimeFigureOut">
               <a:rPr lang="en-CA" smtClean="0"/>
-              <a:t>2018-10-25</a:t>
+              <a:t>2018-11-08</a:t>
             </a:fld>
             <a:endParaRPr lang="en-CA"/>
           </a:p>
@@ -2393,7 +2398,7 @@
           <a:p>
             <a:fld id="{0C1B189D-E4F8-4061-918E-829FAEE4348D}" type="datetimeFigureOut">
               <a:rPr lang="en-CA" smtClean="0"/>
-              <a:t>2018-10-25</a:t>
+              <a:t>2018-11-08</a:t>
             </a:fld>
             <a:endParaRPr lang="en-CA"/>
           </a:p>
@@ -2682,7 +2687,7 @@
           <a:p>
             <a:fld id="{0C1B189D-E4F8-4061-918E-829FAEE4348D}" type="datetimeFigureOut">
               <a:rPr lang="en-CA" smtClean="0"/>
-              <a:t>2018-10-25</a:t>
+              <a:t>2018-11-08</a:t>
             </a:fld>
             <a:endParaRPr lang="en-CA"/>
           </a:p>
@@ -2925,7 +2930,7 @@
           <a:p>
             <a:fld id="{0C1B189D-E4F8-4061-918E-829FAEE4348D}" type="datetimeFigureOut">
               <a:rPr lang="en-CA" smtClean="0"/>
-              <a:t>2018-10-25</a:t>
+              <a:t>2018-11-08</a:t>
             </a:fld>
             <a:endParaRPr lang="en-CA"/>
           </a:p>
@@ -3971,8 +3976,8 @@
         </p:nvSpPr>
         <p:spPr>
           <a:xfrm>
-            <a:off x="3075570" y="1249920"/>
-            <a:ext cx="121416" cy="4860666"/>
+            <a:off x="3075569" y="1249920"/>
+            <a:ext cx="128105" cy="4943782"/>
           </a:xfrm>
           <a:prstGeom prst="rect">
             <a:avLst/>
@@ -4134,8 +4139,8 @@
         </p:nvSpPr>
         <p:spPr>
           <a:xfrm>
-            <a:off x="4317920" y="792719"/>
-            <a:ext cx="1219200" cy="467684"/>
+            <a:off x="4385418" y="808415"/>
+            <a:ext cx="1084204" cy="467684"/>
           </a:xfrm>
           <a:prstGeom prst="rect">
             <a:avLst/>
@@ -4281,27 +4286,8 @@
                 <a:ea typeface="+mn-ea"/>
                 <a:cs typeface="+mn-cs"/>
               </a:rPr>
-              <a:t>:Address</a:t>
-            </a:r>
-          </a:p>
-          <a:p>
-            <a:pPr marL="0" marR="0" lvl="0" indent="0" algn="ctr" defTabSz="914400" rtl="0" eaLnBrk="1" fontAlgn="auto" latinLnBrk="0" hangingPunct="1">
-              <a:lnSpc>
-                <a:spcPct val="100000"/>
-              </a:lnSpc>
-              <a:spcBef>
-                <a:spcPts val="0"/>
-              </a:spcBef>
-              <a:spcAft>
-                <a:spcPts val="0"/>
-              </a:spcAft>
-              <a:buClrTx/>
-              <a:buSzTx/>
-              <a:buFontTx/>
-              <a:buNone/>
-              <a:tabLst/>
-              <a:defRPr/>
-            </a:pPr>
+              <a:t>:</a:t>
+            </a:r>
             <a:r>
               <a:rPr kumimoji="0" lang="en-US" sz="1600" b="0" i="0" u="none" strike="noStrike" kern="1200" cap="none" spc="0" normalizeH="0" baseline="0" noProof="0" dirty="0" err="1">
                 <a:ln>
@@ -4317,7 +4303,7 @@
                 <a:ea typeface="+mn-ea"/>
                 <a:cs typeface="+mn-cs"/>
               </a:rPr>
-              <a:t>BookParser</a:t>
+              <a:t>ConciergeParser</a:t>
             </a:r>
             <a:endParaRPr kumimoji="0" lang="en-SG" sz="1600" b="0" i="0" u="none" strike="noStrike" kern="1200" cap="none" spc="0" normalizeH="0" baseline="0" noProof="0" dirty="0">
               <a:ln>
@@ -4348,13 +4334,14 @@
           <p:cNvCxnSpPr>
             <a:cxnSpLocks/>
             <a:stCxn id="69" idx="2"/>
+            <a:endCxn id="71" idx="0"/>
           </p:cNvCxnSpPr>
           <p:nvPr/>
         </p:nvCxnSpPr>
         <p:spPr>
-          <a:xfrm>
-            <a:off x="4927521" y="1260403"/>
-            <a:ext cx="3799" cy="2748594"/>
+          <a:xfrm flipV="1">
+            <a:off x="4927520" y="1276037"/>
+            <a:ext cx="5486" cy="62"/>
           </a:xfrm>
           <a:prstGeom prst="line">
             <a:avLst/>
@@ -4568,7 +4555,7 @@
         </p:nvSpPr>
         <p:spPr>
           <a:xfrm>
-            <a:off x="6788541" y="1993581"/>
+            <a:off x="6637761" y="1993581"/>
             <a:ext cx="850026" cy="358365"/>
           </a:xfrm>
           <a:prstGeom prst="rect">
@@ -4790,13 +4777,15 @@
           </p:cNvPr>
           <p:cNvCxnSpPr>
             <a:cxnSpLocks/>
+            <a:stCxn id="110" idx="2"/>
+            <a:endCxn id="85" idx="0"/>
           </p:cNvCxnSpPr>
           <p:nvPr/>
         </p:nvCxnSpPr>
         <p:spPr>
           <a:xfrm>
-            <a:off x="7201973" y="2331144"/>
-            <a:ext cx="28210" cy="2686588"/>
+            <a:off x="7226980" y="3776554"/>
+            <a:ext cx="1900" cy="290843"/>
           </a:xfrm>
           <a:prstGeom prst="line">
             <a:avLst/>
@@ -4847,7 +4836,7 @@
         </p:nvSpPr>
         <p:spPr>
           <a:xfrm>
-            <a:off x="7137321" y="2323699"/>
+            <a:off x="6960919" y="2323699"/>
             <a:ext cx="117613" cy="185051"/>
           </a:xfrm>
           <a:prstGeom prst="rect">
@@ -5012,7 +5001,7 @@
         </p:nvCxnSpPr>
         <p:spPr>
           <a:xfrm>
-            <a:off x="1955721" y="1628009"/>
+            <a:off x="1955721" y="1402320"/>
             <a:ext cx="1119851" cy="0"/>
           </a:xfrm>
           <a:prstGeom prst="straightConnector1">
@@ -5076,8 +5065,8 @@
         </p:nvSpPr>
         <p:spPr>
           <a:xfrm>
-            <a:off x="1515234" y="1700879"/>
-            <a:ext cx="1484332" cy="184666"/>
+            <a:off x="1372117" y="1475190"/>
+            <a:ext cx="1627449" cy="184666"/>
           </a:xfrm>
           <a:prstGeom prst="rect">
             <a:avLst/>
@@ -5210,7 +5199,7 @@
                 </a:solidFill>
                 <a:latin typeface="Calibri"/>
               </a:rPr>
-              <a:t> 001”)</a:t>
+              <a:t> r/001”)</a:t>
             </a:r>
           </a:p>
         </p:txBody>
@@ -5232,7 +5221,7 @@
         <p:spPr>
           <a:xfrm>
             <a:off x="6392805" y="2201031"/>
-            <a:ext cx="383077" cy="0"/>
+            <a:ext cx="244956" cy="0"/>
           </a:xfrm>
           <a:prstGeom prst="straightConnector1">
             <a:avLst/>
@@ -5262,7 +5251,7 @@
         </p:nvSpPr>
         <p:spPr>
           <a:xfrm>
-            <a:off x="4927521" y="3840719"/>
+            <a:off x="5045347" y="3840719"/>
             <a:ext cx="1018533" cy="276999"/>
           </a:xfrm>
           <a:prstGeom prst="rect">
@@ -5397,8 +5386,8 @@
         </p:nvCxnSpPr>
         <p:spPr>
           <a:xfrm>
-            <a:off x="6400961" y="2504050"/>
-            <a:ext cx="809294" cy="2043"/>
+            <a:off x="6408457" y="2506093"/>
+            <a:ext cx="625396" cy="0"/>
           </a:xfrm>
           <a:prstGeom prst="straightConnector1">
             <a:avLst/>
@@ -5465,7 +5454,7 @@
         </p:nvCxnSpPr>
         <p:spPr>
           <a:xfrm>
-            <a:off x="1879521" y="5974319"/>
+            <a:off x="1879521" y="6084694"/>
             <a:ext cx="1196051" cy="0"/>
           </a:xfrm>
           <a:prstGeom prst="straightConnector1">
@@ -6180,9 +6169,9 @@
           <p:nvPr/>
         </p:nvCxnSpPr>
         <p:spPr>
-          <a:xfrm flipV="1">
-            <a:off x="2800491" y="6009799"/>
-            <a:ext cx="4428389" cy="2"/>
+          <a:xfrm>
+            <a:off x="3227971" y="6009799"/>
+            <a:ext cx="4000909" cy="0"/>
           </a:xfrm>
           <a:prstGeom prst="straightConnector1">
             <a:avLst/>
@@ -6343,7 +6332,7 @@
                   <a:srgbClr val="0070C0"/>
                 </a:solidFill>
               </a:rPr>
-              <a:t> 001”)</a:t>
+              <a:t> r/001”)</a:t>
             </a:r>
           </a:p>
         </p:txBody>
@@ -6362,8 +6351,8 @@
         </p:nvSpPr>
         <p:spPr>
           <a:xfrm>
-            <a:off x="3317702" y="1326120"/>
-            <a:ext cx="1424846" cy="184666"/>
+            <a:off x="3283530" y="1326120"/>
+            <a:ext cx="1514577" cy="184666"/>
           </a:xfrm>
           <a:prstGeom prst="rect">
             <a:avLst/>
@@ -6495,7 +6484,7 @@
                 </a:solidFill>
                 <a:latin typeface="Calibri"/>
               </a:rPr>
-              <a:t> 001”)</a:t>
+              <a:t> r/001”)</a:t>
             </a:r>
           </a:p>
         </p:txBody>
@@ -6647,7 +6636,7 @@
         </p:nvSpPr>
         <p:spPr>
           <a:xfrm>
-            <a:off x="2174703" y="5721607"/>
+            <a:off x="2174703" y="5831982"/>
             <a:ext cx="762000" cy="276999"/>
           </a:xfrm>
           <a:prstGeom prst="rect">
@@ -7734,13 +7723,14 @@
           </p:cNvPr>
           <p:cNvCxnSpPr>
             <a:cxnSpLocks/>
+            <a:endCxn id="104" idx="0"/>
           </p:cNvCxnSpPr>
           <p:nvPr/>
         </p:nvCxnSpPr>
         <p:spPr>
           <a:xfrm>
             <a:off x="6290008" y="1825281"/>
-            <a:ext cx="3799" cy="2135303"/>
+            <a:ext cx="6002" cy="363768"/>
           </a:xfrm>
           <a:prstGeom prst="line">
             <a:avLst/>
@@ -8043,139 +8033,6 @@
       </p:cxnSp>
       <p:sp>
         <p:nvSpPr>
-          <p:cNvPr id="108" name="TextBox 3">
-            <a:extLst>
-              <a:ext uri="{FF2B5EF4-FFF2-40B4-BE49-F238E27FC236}">
-                <a16:creationId xmlns:a16="http://schemas.microsoft.com/office/drawing/2014/main" id="{B1A204EC-9C5E-42CA-BD09-9F99DC434B87}"/>
-              </a:ext>
-            </a:extLst>
-          </p:cNvPr>
-          <p:cNvSpPr txBox="1"/>
-          <p:nvPr/>
-        </p:nvSpPr>
-        <p:spPr>
-          <a:xfrm>
-            <a:off x="6637761" y="3450780"/>
-            <a:ext cx="463460" cy="369332"/>
-          </a:xfrm>
-          <a:prstGeom prst="rect">
-            <a:avLst/>
-          </a:prstGeom>
-          <a:noFill/>
-        </p:spPr>
-        <p:txBody>
-          <a:bodyPr wrap="square" rtlCol="0">
-            <a:spAutoFit/>
-          </a:bodyPr>
-          <a:lstStyle>
-            <a:defPPr>
-              <a:defRPr lang="en-US"/>
-            </a:defPPr>
-            <a:lvl1pPr marL="0" algn="l" defTabSz="914400" rtl="0" eaLnBrk="1" latinLnBrk="0" hangingPunct="1">
-              <a:defRPr sz="1800" kern="1200">
-                <a:solidFill>
-                  <a:schemeClr val="tx1"/>
-                </a:solidFill>
-                <a:latin typeface="+mn-lt"/>
-                <a:ea typeface="+mn-ea"/>
-                <a:cs typeface="+mn-cs"/>
-              </a:defRPr>
-            </a:lvl1pPr>
-            <a:lvl2pPr marL="457200" algn="l" defTabSz="914400" rtl="0" eaLnBrk="1" latinLnBrk="0" hangingPunct="1">
-              <a:defRPr sz="1800" kern="1200">
-                <a:solidFill>
-                  <a:schemeClr val="tx1"/>
-                </a:solidFill>
-                <a:latin typeface="+mn-lt"/>
-                <a:ea typeface="+mn-ea"/>
-                <a:cs typeface="+mn-cs"/>
-              </a:defRPr>
-            </a:lvl2pPr>
-            <a:lvl3pPr marL="914400" algn="l" defTabSz="914400" rtl="0" eaLnBrk="1" latinLnBrk="0" hangingPunct="1">
-              <a:defRPr sz="1800" kern="1200">
-                <a:solidFill>
-                  <a:schemeClr val="tx1"/>
-                </a:solidFill>
-                <a:latin typeface="+mn-lt"/>
-                <a:ea typeface="+mn-ea"/>
-                <a:cs typeface="+mn-cs"/>
-              </a:defRPr>
-            </a:lvl3pPr>
-            <a:lvl4pPr marL="1371600" algn="l" defTabSz="914400" rtl="0" eaLnBrk="1" latinLnBrk="0" hangingPunct="1">
-              <a:defRPr sz="1800" kern="1200">
-                <a:solidFill>
-                  <a:schemeClr val="tx1"/>
-                </a:solidFill>
-                <a:latin typeface="+mn-lt"/>
-                <a:ea typeface="+mn-ea"/>
-                <a:cs typeface="+mn-cs"/>
-              </a:defRPr>
-            </a:lvl4pPr>
-            <a:lvl5pPr marL="1828800" algn="l" defTabSz="914400" rtl="0" eaLnBrk="1" latinLnBrk="0" hangingPunct="1">
-              <a:defRPr sz="1800" kern="1200">
-                <a:solidFill>
-                  <a:schemeClr val="tx1"/>
-                </a:solidFill>
-                <a:latin typeface="+mn-lt"/>
-                <a:ea typeface="+mn-ea"/>
-                <a:cs typeface="+mn-cs"/>
-              </a:defRPr>
-            </a:lvl5pPr>
-            <a:lvl6pPr marL="2286000" algn="l" defTabSz="914400" rtl="0" eaLnBrk="1" latinLnBrk="0" hangingPunct="1">
-              <a:defRPr sz="1800" kern="1200">
-                <a:solidFill>
-                  <a:schemeClr val="tx1"/>
-                </a:solidFill>
-                <a:latin typeface="+mn-lt"/>
-                <a:ea typeface="+mn-ea"/>
-                <a:cs typeface="+mn-cs"/>
-              </a:defRPr>
-            </a:lvl6pPr>
-            <a:lvl7pPr marL="2743200" algn="l" defTabSz="914400" rtl="0" eaLnBrk="1" latinLnBrk="0" hangingPunct="1">
-              <a:defRPr sz="1800" kern="1200">
-                <a:solidFill>
-                  <a:schemeClr val="tx1"/>
-                </a:solidFill>
-                <a:latin typeface="+mn-lt"/>
-                <a:ea typeface="+mn-ea"/>
-                <a:cs typeface="+mn-cs"/>
-              </a:defRPr>
-            </a:lvl7pPr>
-            <a:lvl8pPr marL="3200400" algn="l" defTabSz="914400" rtl="0" eaLnBrk="1" latinLnBrk="0" hangingPunct="1">
-              <a:defRPr sz="1800" kern="1200">
-                <a:solidFill>
-                  <a:schemeClr val="tx1"/>
-                </a:solidFill>
-                <a:latin typeface="+mn-lt"/>
-                <a:ea typeface="+mn-ea"/>
-                <a:cs typeface="+mn-cs"/>
-              </a:defRPr>
-            </a:lvl8pPr>
-            <a:lvl9pPr marL="3657600" algn="l" defTabSz="914400" rtl="0" eaLnBrk="1" latinLnBrk="0" hangingPunct="1">
-              <a:defRPr sz="1800" kern="1200">
-                <a:solidFill>
-                  <a:schemeClr val="tx1"/>
-                </a:solidFill>
-                <a:latin typeface="+mn-lt"/>
-                <a:ea typeface="+mn-ea"/>
-                <a:cs typeface="+mn-cs"/>
-              </a:defRPr>
-            </a:lvl9pPr>
-          </a:lstStyle>
-          <a:p>
-            <a:r>
-              <a:rPr lang="en-US" dirty="0">
-                <a:solidFill>
-                  <a:srgbClr val="0070C0"/>
-                </a:solidFill>
-              </a:rPr>
-              <a:t>c</a:t>
-            </a:r>
-          </a:p>
-        </p:txBody>
-      </p:sp>
-      <p:sp>
-        <p:nvSpPr>
           <p:cNvPr id="109" name="Rectangle 108">
             <a:extLst>
               <a:ext uri="{FF2B5EF4-FFF2-40B4-BE49-F238E27FC236}">
@@ -8368,8 +8225,8 @@
         </p:nvSpPr>
         <p:spPr>
           <a:xfrm>
-            <a:off x="7159640" y="2935032"/>
-            <a:ext cx="125330" cy="847461"/>
+            <a:off x="7169110" y="2938913"/>
+            <a:ext cx="115739" cy="837641"/>
           </a:xfrm>
           <a:prstGeom prst="rect">
             <a:avLst/>
@@ -8732,9 +8589,9 @@
           <p:nvPr/>
         </p:nvCxnSpPr>
         <p:spPr>
-          <a:xfrm>
-            <a:off x="6412389" y="3758779"/>
-            <a:ext cx="733069" cy="6940"/>
+          <a:xfrm flipV="1">
+            <a:off x="6412389" y="3752655"/>
+            <a:ext cx="876259" cy="6124"/>
           </a:xfrm>
           <a:prstGeom prst="straightConnector1">
             <a:avLst/>

</xml_diff>